<commit_message>
Implementação de uma Binary Tree (Com insert and search)
</commit_message>
<xml_diff>
--- a/Raciocionios.pptx
+++ b/Raciocionios.pptx
@@ -6,6 +6,7 @@
   </p:sldMasterIdLst>
   <p:sldIdLst>
     <p:sldId id="256" r:id="rId2"/>
+    <p:sldId id="257" r:id="rId3"/>
   </p:sldIdLst>
   <p:sldSz cx="12192000" cy="6858000"/>
   <p:notesSz cx="6858000" cy="9144000"/>
@@ -104,6 +105,11 @@
       </a:defRPr>
     </a:lvl9pPr>
   </p:defaultTextStyle>
+  <p:extLst>
+    <p:ext uri="{EFAFB233-063F-42B5-8137-9DF3F51BA10A}">
+      <p15:sldGuideLst xmlns:p15="http://schemas.microsoft.com/office/powerpoint/2012/main"/>
+    </p:ext>
+  </p:extLst>
 </p:presentation>
 </file>
 
@@ -254,7 +260,7 @@
           <a:p>
             <a:fld id="{88F4F309-FBE4-4B71-A1E6-5DFB133D64B1}" type="datetimeFigureOut">
               <a:rPr lang="en-US" smtClean="0"/>
-              <a:t>9/19/2025</a:t>
+              <a:t>10/4/2025</a:t>
             </a:fld>
             <a:endParaRPr lang="en-US"/>
           </a:p>
@@ -452,7 +458,7 @@
           <a:p>
             <a:fld id="{88F4F309-FBE4-4B71-A1E6-5DFB133D64B1}" type="datetimeFigureOut">
               <a:rPr lang="en-US" smtClean="0"/>
-              <a:t>9/19/2025</a:t>
+              <a:t>10/4/2025</a:t>
             </a:fld>
             <a:endParaRPr lang="en-US"/>
           </a:p>
@@ -660,7 +666,7 @@
           <a:p>
             <a:fld id="{88F4F309-FBE4-4B71-A1E6-5DFB133D64B1}" type="datetimeFigureOut">
               <a:rPr lang="en-US" smtClean="0"/>
-              <a:t>9/19/2025</a:t>
+              <a:t>10/4/2025</a:t>
             </a:fld>
             <a:endParaRPr lang="en-US"/>
           </a:p>
@@ -858,7 +864,7 @@
           <a:p>
             <a:fld id="{88F4F309-FBE4-4B71-A1E6-5DFB133D64B1}" type="datetimeFigureOut">
               <a:rPr lang="en-US" smtClean="0"/>
-              <a:t>9/19/2025</a:t>
+              <a:t>10/4/2025</a:t>
             </a:fld>
             <a:endParaRPr lang="en-US"/>
           </a:p>
@@ -1133,7 +1139,7 @@
           <a:p>
             <a:fld id="{88F4F309-FBE4-4B71-A1E6-5DFB133D64B1}" type="datetimeFigureOut">
               <a:rPr lang="en-US" smtClean="0"/>
-              <a:t>9/19/2025</a:t>
+              <a:t>10/4/2025</a:t>
             </a:fld>
             <a:endParaRPr lang="en-US"/>
           </a:p>
@@ -1398,7 +1404,7 @@
           <a:p>
             <a:fld id="{88F4F309-FBE4-4B71-A1E6-5DFB133D64B1}" type="datetimeFigureOut">
               <a:rPr lang="en-US" smtClean="0"/>
-              <a:t>9/19/2025</a:t>
+              <a:t>10/4/2025</a:t>
             </a:fld>
             <a:endParaRPr lang="en-US"/>
           </a:p>
@@ -1810,7 +1816,7 @@
           <a:p>
             <a:fld id="{88F4F309-FBE4-4B71-A1E6-5DFB133D64B1}" type="datetimeFigureOut">
               <a:rPr lang="en-US" smtClean="0"/>
-              <a:t>9/19/2025</a:t>
+              <a:t>10/4/2025</a:t>
             </a:fld>
             <a:endParaRPr lang="en-US"/>
           </a:p>
@@ -1951,7 +1957,7 @@
           <a:p>
             <a:fld id="{88F4F309-FBE4-4B71-A1E6-5DFB133D64B1}" type="datetimeFigureOut">
               <a:rPr lang="en-US" smtClean="0"/>
-              <a:t>9/19/2025</a:t>
+              <a:t>10/4/2025</a:t>
             </a:fld>
             <a:endParaRPr lang="en-US"/>
           </a:p>
@@ -2064,7 +2070,7 @@
           <a:p>
             <a:fld id="{88F4F309-FBE4-4B71-A1E6-5DFB133D64B1}" type="datetimeFigureOut">
               <a:rPr lang="en-US" smtClean="0"/>
-              <a:t>9/19/2025</a:t>
+              <a:t>10/4/2025</a:t>
             </a:fld>
             <a:endParaRPr lang="en-US"/>
           </a:p>
@@ -2375,7 +2381,7 @@
           <a:p>
             <a:fld id="{88F4F309-FBE4-4B71-A1E6-5DFB133D64B1}" type="datetimeFigureOut">
               <a:rPr lang="en-US" smtClean="0"/>
-              <a:t>9/19/2025</a:t>
+              <a:t>10/4/2025</a:t>
             </a:fld>
             <a:endParaRPr lang="en-US"/>
           </a:p>
@@ -2663,7 +2669,7 @@
           <a:p>
             <a:fld id="{88F4F309-FBE4-4B71-A1E6-5DFB133D64B1}" type="datetimeFigureOut">
               <a:rPr lang="en-US" smtClean="0"/>
-              <a:t>9/19/2025</a:t>
+              <a:t>10/4/2025</a:t>
             </a:fld>
             <a:endParaRPr lang="en-US"/>
           </a:p>
@@ -2904,7 +2910,7 @@
           <a:p>
             <a:fld id="{88F4F309-FBE4-4B71-A1E6-5DFB133D64B1}" type="datetimeFigureOut">
               <a:rPr lang="en-US" smtClean="0"/>
-              <a:t>9/19/2025</a:t>
+              <a:t>10/4/2025</a:t>
             </a:fld>
             <a:endParaRPr lang="en-US"/>
           </a:p>
@@ -3754,6 +3760,872 @@
     <p:extLst>
       <p:ext uri="{BB962C8B-B14F-4D97-AF65-F5344CB8AC3E}">
         <p14:creationId xmlns:p14="http://schemas.microsoft.com/office/powerpoint/2010/main" val="2942247074"/>
+      </p:ext>
+    </p:extLst>
+  </p:cSld>
+  <p:clrMapOvr>
+    <a:masterClrMapping/>
+  </p:clrMapOvr>
+</p:sld>
+</file>
+
+<file path=ppt/slides/slide2.xml><?xml version="1.0" encoding="utf-8"?>
+<p:sld xmlns:a="http://schemas.openxmlformats.org/drawingml/2006/main" xmlns:r="http://schemas.openxmlformats.org/officeDocument/2006/relationships" xmlns:p="http://schemas.openxmlformats.org/presentationml/2006/main">
+  <p:cSld>
+    <p:spTree>
+      <p:nvGrpSpPr>
+        <p:cNvPr id="1" name="">
+          <a:extLst>
+            <a:ext uri="{FF2B5EF4-FFF2-40B4-BE49-F238E27FC236}">
+              <a16:creationId xmlns:a16="http://schemas.microsoft.com/office/drawing/2014/main" id="{52C249F5-B37C-8DEE-979E-4E101BD121B0}"/>
+            </a:ext>
+          </a:extLst>
+        </p:cNvPr>
+        <p:cNvGrpSpPr/>
+        <p:nvPr/>
+      </p:nvGrpSpPr>
+      <p:grpSpPr>
+        <a:xfrm>
+          <a:off x="0" y="0"/>
+          <a:ext cx="0" cy="0"/>
+          <a:chOff x="0" y="0"/>
+          <a:chExt cx="0" cy="0"/>
+        </a:xfrm>
+      </p:grpSpPr>
+      <p:sp>
+        <p:nvSpPr>
+          <p:cNvPr id="4" name="Rectangle: Rounded Corners 3">
+            <a:extLst>
+              <a:ext uri="{FF2B5EF4-FFF2-40B4-BE49-F238E27FC236}">
+                <a16:creationId xmlns:a16="http://schemas.microsoft.com/office/drawing/2014/main" id="{BFA59B4E-E776-641D-3032-A337BF158C75}"/>
+              </a:ext>
+            </a:extLst>
+          </p:cNvPr>
+          <p:cNvSpPr/>
+          <p:nvPr/>
+        </p:nvSpPr>
+        <p:spPr>
+          <a:xfrm>
+            <a:off x="2929351" y="3226787"/>
+            <a:ext cx="828000" cy="828000"/>
+          </a:xfrm>
+          <a:prstGeom prst="roundRect">
+            <a:avLst/>
+          </a:prstGeom>
+          <a:solidFill>
+            <a:schemeClr val="bg1"/>
+          </a:solidFill>
+          <a:ln>
+            <a:solidFill>
+              <a:schemeClr val="tx1">
+                <a:lumMod val="75000"/>
+                <a:lumOff val="25000"/>
+              </a:schemeClr>
+            </a:solidFill>
+          </a:ln>
+        </p:spPr>
+        <p:style>
+          <a:lnRef idx="2">
+            <a:schemeClr val="accent1">
+              <a:shade val="15000"/>
+            </a:schemeClr>
+          </a:lnRef>
+          <a:fillRef idx="1">
+            <a:schemeClr val="accent1"/>
+          </a:fillRef>
+          <a:effectRef idx="0">
+            <a:schemeClr val="accent1"/>
+          </a:effectRef>
+          <a:fontRef idx="minor">
+            <a:schemeClr val="lt1"/>
+          </a:fontRef>
+        </p:style>
+        <p:txBody>
+          <a:bodyPr rtlCol="0" anchor="ctr"/>
+          <a:lstStyle/>
+          <a:p>
+            <a:pPr algn="ctr"/>
+            <a:r>
+              <a:rPr lang="pt-BR" dirty="0">
+                <a:solidFill>
+                  <a:schemeClr val="tx1">
+                    <a:lumMod val="65000"/>
+                    <a:lumOff val="35000"/>
+                  </a:schemeClr>
+                </a:solidFill>
+              </a:rPr>
+              <a:t>1</a:t>
+            </a:r>
+            <a:endParaRPr lang="en-US" dirty="0">
+              <a:solidFill>
+                <a:schemeClr val="tx1">
+                  <a:lumMod val="65000"/>
+                  <a:lumOff val="35000"/>
+                </a:schemeClr>
+              </a:solidFill>
+            </a:endParaRPr>
+          </a:p>
+        </p:txBody>
+      </p:sp>
+      <p:sp>
+        <p:nvSpPr>
+          <p:cNvPr id="5" name="Rectangle: Rounded Corners 4">
+            <a:extLst>
+              <a:ext uri="{FF2B5EF4-FFF2-40B4-BE49-F238E27FC236}">
+                <a16:creationId xmlns:a16="http://schemas.microsoft.com/office/drawing/2014/main" id="{D259CEC7-4FCF-127C-C4FF-47837069A201}"/>
+              </a:ext>
+            </a:extLst>
+          </p:cNvPr>
+          <p:cNvSpPr/>
+          <p:nvPr/>
+        </p:nvSpPr>
+        <p:spPr>
+          <a:xfrm>
+            <a:off x="3757351" y="3226787"/>
+            <a:ext cx="828000" cy="828000"/>
+          </a:xfrm>
+          <a:prstGeom prst="roundRect">
+            <a:avLst/>
+          </a:prstGeom>
+          <a:solidFill>
+            <a:schemeClr val="bg1"/>
+          </a:solidFill>
+          <a:ln>
+            <a:solidFill>
+              <a:schemeClr val="tx1">
+                <a:lumMod val="75000"/>
+                <a:lumOff val="25000"/>
+              </a:schemeClr>
+            </a:solidFill>
+          </a:ln>
+        </p:spPr>
+        <p:style>
+          <a:lnRef idx="2">
+            <a:schemeClr val="accent1">
+              <a:shade val="15000"/>
+            </a:schemeClr>
+          </a:lnRef>
+          <a:fillRef idx="1">
+            <a:schemeClr val="accent1"/>
+          </a:fillRef>
+          <a:effectRef idx="0">
+            <a:schemeClr val="accent1"/>
+          </a:effectRef>
+          <a:fontRef idx="minor">
+            <a:schemeClr val="lt1"/>
+          </a:fontRef>
+        </p:style>
+        <p:txBody>
+          <a:bodyPr rtlCol="0" anchor="ctr"/>
+          <a:lstStyle/>
+          <a:p>
+            <a:pPr algn="ctr"/>
+            <a:r>
+              <a:rPr lang="pt-BR" dirty="0">
+                <a:solidFill>
+                  <a:schemeClr val="tx1">
+                    <a:lumMod val="65000"/>
+                    <a:lumOff val="35000"/>
+                  </a:schemeClr>
+                </a:solidFill>
+              </a:rPr>
+              <a:t>1</a:t>
+            </a:r>
+            <a:endParaRPr lang="en-US" dirty="0">
+              <a:solidFill>
+                <a:schemeClr val="tx1">
+                  <a:lumMod val="65000"/>
+                  <a:lumOff val="35000"/>
+                </a:schemeClr>
+              </a:solidFill>
+            </a:endParaRPr>
+          </a:p>
+        </p:txBody>
+      </p:sp>
+      <p:sp>
+        <p:nvSpPr>
+          <p:cNvPr id="6" name="Rectangle: Rounded Corners 5">
+            <a:extLst>
+              <a:ext uri="{FF2B5EF4-FFF2-40B4-BE49-F238E27FC236}">
+                <a16:creationId xmlns:a16="http://schemas.microsoft.com/office/drawing/2014/main" id="{62B7F5BE-B16C-7217-4D05-2BFE3E3234CA}"/>
+              </a:ext>
+            </a:extLst>
+          </p:cNvPr>
+          <p:cNvSpPr/>
+          <p:nvPr/>
+        </p:nvSpPr>
+        <p:spPr>
+          <a:xfrm>
+            <a:off x="4585351" y="3226787"/>
+            <a:ext cx="828000" cy="828000"/>
+          </a:xfrm>
+          <a:prstGeom prst="roundRect">
+            <a:avLst/>
+          </a:prstGeom>
+          <a:solidFill>
+            <a:schemeClr val="bg1"/>
+          </a:solidFill>
+          <a:ln>
+            <a:solidFill>
+              <a:schemeClr val="tx1">
+                <a:lumMod val="75000"/>
+                <a:lumOff val="25000"/>
+              </a:schemeClr>
+            </a:solidFill>
+          </a:ln>
+        </p:spPr>
+        <p:style>
+          <a:lnRef idx="2">
+            <a:schemeClr val="accent1">
+              <a:shade val="15000"/>
+            </a:schemeClr>
+          </a:lnRef>
+          <a:fillRef idx="1">
+            <a:schemeClr val="accent1"/>
+          </a:fillRef>
+          <a:effectRef idx="0">
+            <a:schemeClr val="accent1"/>
+          </a:effectRef>
+          <a:fontRef idx="minor">
+            <a:schemeClr val="lt1"/>
+          </a:fontRef>
+        </p:style>
+        <p:txBody>
+          <a:bodyPr rtlCol="0" anchor="ctr"/>
+          <a:lstStyle/>
+          <a:p>
+            <a:pPr algn="ctr"/>
+            <a:r>
+              <a:rPr lang="pt-BR" dirty="0">
+                <a:solidFill>
+                  <a:schemeClr val="tx1">
+                    <a:lumMod val="65000"/>
+                    <a:lumOff val="35000"/>
+                  </a:schemeClr>
+                </a:solidFill>
+              </a:rPr>
+              <a:t>1</a:t>
+            </a:r>
+            <a:endParaRPr lang="en-US" dirty="0">
+              <a:solidFill>
+                <a:schemeClr val="tx1">
+                  <a:lumMod val="65000"/>
+                  <a:lumOff val="35000"/>
+                </a:schemeClr>
+              </a:solidFill>
+            </a:endParaRPr>
+          </a:p>
+        </p:txBody>
+      </p:sp>
+      <p:sp>
+        <p:nvSpPr>
+          <p:cNvPr id="7" name="Rectangle: Rounded Corners 6">
+            <a:extLst>
+              <a:ext uri="{FF2B5EF4-FFF2-40B4-BE49-F238E27FC236}">
+                <a16:creationId xmlns:a16="http://schemas.microsoft.com/office/drawing/2014/main" id="{A9CBFBE9-C880-A394-049C-7B13111337C3}"/>
+              </a:ext>
+            </a:extLst>
+          </p:cNvPr>
+          <p:cNvSpPr/>
+          <p:nvPr/>
+        </p:nvSpPr>
+        <p:spPr>
+          <a:xfrm>
+            <a:off x="5413351" y="3226787"/>
+            <a:ext cx="828000" cy="828000"/>
+          </a:xfrm>
+          <a:prstGeom prst="roundRect">
+            <a:avLst/>
+          </a:prstGeom>
+          <a:solidFill>
+            <a:schemeClr val="bg1"/>
+          </a:solidFill>
+          <a:ln>
+            <a:solidFill>
+              <a:schemeClr val="tx1">
+                <a:lumMod val="75000"/>
+                <a:lumOff val="25000"/>
+              </a:schemeClr>
+            </a:solidFill>
+          </a:ln>
+        </p:spPr>
+        <p:style>
+          <a:lnRef idx="2">
+            <a:schemeClr val="accent1">
+              <a:shade val="15000"/>
+            </a:schemeClr>
+          </a:lnRef>
+          <a:fillRef idx="1">
+            <a:schemeClr val="accent1"/>
+          </a:fillRef>
+          <a:effectRef idx="0">
+            <a:schemeClr val="accent1"/>
+          </a:effectRef>
+          <a:fontRef idx="minor">
+            <a:schemeClr val="lt1"/>
+          </a:fontRef>
+        </p:style>
+        <p:txBody>
+          <a:bodyPr rtlCol="0" anchor="ctr"/>
+          <a:lstStyle/>
+          <a:p>
+            <a:pPr algn="ctr"/>
+            <a:r>
+              <a:rPr lang="pt-BR" dirty="0">
+                <a:solidFill>
+                  <a:schemeClr val="tx1">
+                    <a:lumMod val="65000"/>
+                    <a:lumOff val="35000"/>
+                  </a:schemeClr>
+                </a:solidFill>
+              </a:rPr>
+              <a:t>1</a:t>
+            </a:r>
+            <a:endParaRPr lang="en-US" dirty="0">
+              <a:solidFill>
+                <a:schemeClr val="tx1">
+                  <a:lumMod val="65000"/>
+                  <a:lumOff val="35000"/>
+                </a:schemeClr>
+              </a:solidFill>
+            </a:endParaRPr>
+          </a:p>
+        </p:txBody>
+      </p:sp>
+      <p:sp>
+        <p:nvSpPr>
+          <p:cNvPr id="8" name="TextBox 7">
+            <a:extLst>
+              <a:ext uri="{FF2B5EF4-FFF2-40B4-BE49-F238E27FC236}">
+                <a16:creationId xmlns:a16="http://schemas.microsoft.com/office/drawing/2014/main" id="{775F30A7-2ADE-B26F-2881-35A1ADAF0703}"/>
+              </a:ext>
+            </a:extLst>
+          </p:cNvPr>
+          <p:cNvSpPr txBox="1"/>
+          <p:nvPr/>
+        </p:nvSpPr>
+        <p:spPr>
+          <a:xfrm>
+            <a:off x="256032" y="192024"/>
+            <a:ext cx="2314160" cy="369332"/>
+          </a:xfrm>
+          <a:prstGeom prst="rect">
+            <a:avLst/>
+          </a:prstGeom>
+          <a:noFill/>
+        </p:spPr>
+        <p:txBody>
+          <a:bodyPr wrap="none" rtlCol="0">
+            <a:spAutoFit/>
+          </a:bodyPr>
+          <a:lstStyle/>
+          <a:p>
+            <a:r>
+              <a:rPr lang="pt-BR" dirty="0"/>
+              <a:t>191. </a:t>
+            </a:r>
+            <a:r>
+              <a:rPr lang="pt-BR" dirty="0" err="1"/>
+              <a:t>Number</a:t>
+            </a:r>
+            <a:r>
+              <a:rPr lang="pt-BR" dirty="0"/>
+              <a:t> </a:t>
+            </a:r>
+            <a:r>
+              <a:rPr lang="pt-BR" dirty="0" err="1"/>
+              <a:t>of</a:t>
+            </a:r>
+            <a:r>
+              <a:rPr lang="pt-BR" dirty="0"/>
+              <a:t> 1 bits</a:t>
+            </a:r>
+            <a:endParaRPr lang="en-US" dirty="0"/>
+          </a:p>
+        </p:txBody>
+      </p:sp>
+      <p:sp>
+        <p:nvSpPr>
+          <p:cNvPr id="2" name="Rectangle: Rounded Corners 1">
+            <a:extLst>
+              <a:ext uri="{FF2B5EF4-FFF2-40B4-BE49-F238E27FC236}">
+                <a16:creationId xmlns:a16="http://schemas.microsoft.com/office/drawing/2014/main" id="{88EB339F-C27C-6F42-A851-B1CAC753F6B5}"/>
+              </a:ext>
+            </a:extLst>
+          </p:cNvPr>
+          <p:cNvSpPr/>
+          <p:nvPr/>
+        </p:nvSpPr>
+        <p:spPr>
+          <a:xfrm>
+            <a:off x="4585351" y="1137433"/>
+            <a:ext cx="828000" cy="828000"/>
+          </a:xfrm>
+          <a:prstGeom prst="roundRect">
+            <a:avLst/>
+          </a:prstGeom>
+          <a:solidFill>
+            <a:schemeClr val="bg1"/>
+          </a:solidFill>
+          <a:ln>
+            <a:solidFill>
+              <a:schemeClr val="tx1">
+                <a:lumMod val="75000"/>
+                <a:lumOff val="25000"/>
+              </a:schemeClr>
+            </a:solidFill>
+          </a:ln>
+        </p:spPr>
+        <p:style>
+          <a:lnRef idx="2">
+            <a:schemeClr val="accent1">
+              <a:shade val="15000"/>
+            </a:schemeClr>
+          </a:lnRef>
+          <a:fillRef idx="1">
+            <a:schemeClr val="accent1"/>
+          </a:fillRef>
+          <a:effectRef idx="0">
+            <a:schemeClr val="accent1"/>
+          </a:effectRef>
+          <a:fontRef idx="minor">
+            <a:schemeClr val="lt1"/>
+          </a:fontRef>
+        </p:style>
+        <p:txBody>
+          <a:bodyPr rtlCol="0" anchor="ctr"/>
+          <a:lstStyle/>
+          <a:p>
+            <a:pPr algn="ctr"/>
+            <a:r>
+              <a:rPr lang="pt-BR" dirty="0">
+                <a:solidFill>
+                  <a:schemeClr val="tx1">
+                    <a:lumMod val="65000"/>
+                    <a:lumOff val="35000"/>
+                  </a:schemeClr>
+                </a:solidFill>
+              </a:rPr>
+              <a:t>31</a:t>
+            </a:r>
+            <a:endParaRPr lang="en-US" dirty="0">
+              <a:solidFill>
+                <a:schemeClr val="tx1">
+                  <a:lumMod val="65000"/>
+                  <a:lumOff val="35000"/>
+                </a:schemeClr>
+              </a:solidFill>
+            </a:endParaRPr>
+          </a:p>
+        </p:txBody>
+      </p:sp>
+      <p:sp>
+        <p:nvSpPr>
+          <p:cNvPr id="3" name="Rectangle: Rounded Corners 2">
+            <a:extLst>
+              <a:ext uri="{FF2B5EF4-FFF2-40B4-BE49-F238E27FC236}">
+                <a16:creationId xmlns:a16="http://schemas.microsoft.com/office/drawing/2014/main" id="{BA26E5F4-3D60-E6DB-527F-BBE609D2AE58}"/>
+              </a:ext>
+            </a:extLst>
+          </p:cNvPr>
+          <p:cNvSpPr/>
+          <p:nvPr/>
+        </p:nvSpPr>
+        <p:spPr>
+          <a:xfrm>
+            <a:off x="6241351" y="3226787"/>
+            <a:ext cx="828000" cy="828000"/>
+          </a:xfrm>
+          <a:prstGeom prst="roundRect">
+            <a:avLst/>
+          </a:prstGeom>
+          <a:solidFill>
+            <a:schemeClr val="bg1"/>
+          </a:solidFill>
+          <a:ln>
+            <a:solidFill>
+              <a:schemeClr val="tx1">
+                <a:lumMod val="75000"/>
+                <a:lumOff val="25000"/>
+              </a:schemeClr>
+            </a:solidFill>
+          </a:ln>
+        </p:spPr>
+        <p:style>
+          <a:lnRef idx="2">
+            <a:schemeClr val="accent1">
+              <a:shade val="15000"/>
+            </a:schemeClr>
+          </a:lnRef>
+          <a:fillRef idx="1">
+            <a:schemeClr val="accent1"/>
+          </a:fillRef>
+          <a:effectRef idx="0">
+            <a:schemeClr val="accent1"/>
+          </a:effectRef>
+          <a:fontRef idx="minor">
+            <a:schemeClr val="lt1"/>
+          </a:fontRef>
+        </p:style>
+        <p:txBody>
+          <a:bodyPr rtlCol="0" anchor="ctr"/>
+          <a:lstStyle/>
+          <a:p>
+            <a:pPr algn="ctr"/>
+            <a:r>
+              <a:rPr lang="pt-BR" dirty="0">
+                <a:solidFill>
+                  <a:schemeClr val="tx1">
+                    <a:lumMod val="65000"/>
+                    <a:lumOff val="35000"/>
+                  </a:schemeClr>
+                </a:solidFill>
+              </a:rPr>
+              <a:t>0</a:t>
+            </a:r>
+            <a:endParaRPr lang="en-US" dirty="0">
+              <a:solidFill>
+                <a:schemeClr val="tx1">
+                  <a:lumMod val="65000"/>
+                  <a:lumOff val="35000"/>
+                </a:schemeClr>
+              </a:solidFill>
+            </a:endParaRPr>
+          </a:p>
+        </p:txBody>
+      </p:sp>
+      <p:sp>
+        <p:nvSpPr>
+          <p:cNvPr id="9" name="TextBox 8">
+            <a:extLst>
+              <a:ext uri="{FF2B5EF4-FFF2-40B4-BE49-F238E27FC236}">
+                <a16:creationId xmlns:a16="http://schemas.microsoft.com/office/drawing/2014/main" id="{865E42C2-AE8F-FA17-297D-D41F4B6D2EDE}"/>
+              </a:ext>
+            </a:extLst>
+          </p:cNvPr>
+          <p:cNvSpPr txBox="1"/>
+          <p:nvPr/>
+        </p:nvSpPr>
+        <p:spPr>
+          <a:xfrm>
+            <a:off x="6527528" y="4198374"/>
+            <a:ext cx="308098" cy="369332"/>
+          </a:xfrm>
+          <a:prstGeom prst="rect">
+            <a:avLst/>
+          </a:prstGeom>
+          <a:noFill/>
+        </p:spPr>
+        <p:txBody>
+          <a:bodyPr wrap="none" rtlCol="0">
+            <a:spAutoFit/>
+          </a:bodyPr>
+          <a:lstStyle/>
+          <a:p>
+            <a:r>
+              <a:rPr lang="pt-BR" dirty="0"/>
+              <a:t>1</a:t>
+            </a:r>
+            <a:endParaRPr lang="en-US" dirty="0"/>
+          </a:p>
+        </p:txBody>
+      </p:sp>
+      <p:sp>
+        <p:nvSpPr>
+          <p:cNvPr id="11" name="TextBox 10">
+            <a:extLst>
+              <a:ext uri="{FF2B5EF4-FFF2-40B4-BE49-F238E27FC236}">
+                <a16:creationId xmlns:a16="http://schemas.microsoft.com/office/drawing/2014/main" id="{3C213B9B-8979-16BE-C2B2-6AD8C0305E35}"/>
+              </a:ext>
+            </a:extLst>
+          </p:cNvPr>
+          <p:cNvSpPr txBox="1"/>
+          <p:nvPr/>
+        </p:nvSpPr>
+        <p:spPr>
+          <a:xfrm>
+            <a:off x="5673302" y="4198374"/>
+            <a:ext cx="308098" cy="369332"/>
+          </a:xfrm>
+          <a:prstGeom prst="rect">
+            <a:avLst/>
+          </a:prstGeom>
+          <a:noFill/>
+        </p:spPr>
+        <p:txBody>
+          <a:bodyPr wrap="none" rtlCol="0">
+            <a:spAutoFit/>
+          </a:bodyPr>
+          <a:lstStyle/>
+          <a:p>
+            <a:r>
+              <a:rPr lang="pt-BR" dirty="0"/>
+              <a:t>2</a:t>
+            </a:r>
+            <a:endParaRPr lang="en-US" dirty="0"/>
+          </a:p>
+        </p:txBody>
+      </p:sp>
+      <p:sp>
+        <p:nvSpPr>
+          <p:cNvPr id="13" name="TextBox 12">
+            <a:extLst>
+              <a:ext uri="{FF2B5EF4-FFF2-40B4-BE49-F238E27FC236}">
+                <a16:creationId xmlns:a16="http://schemas.microsoft.com/office/drawing/2014/main" id="{2704D36B-EAB5-2FC6-C6B7-B682436B3B97}"/>
+              </a:ext>
+            </a:extLst>
+          </p:cNvPr>
+          <p:cNvSpPr txBox="1"/>
+          <p:nvPr/>
+        </p:nvSpPr>
+        <p:spPr>
+          <a:xfrm>
+            <a:off x="4845302" y="4198374"/>
+            <a:ext cx="308098" cy="369332"/>
+          </a:xfrm>
+          <a:prstGeom prst="rect">
+            <a:avLst/>
+          </a:prstGeom>
+          <a:noFill/>
+        </p:spPr>
+        <p:txBody>
+          <a:bodyPr wrap="none" rtlCol="0">
+            <a:spAutoFit/>
+          </a:bodyPr>
+          <a:lstStyle/>
+          <a:p>
+            <a:r>
+              <a:rPr lang="pt-BR" dirty="0"/>
+              <a:t>4</a:t>
+            </a:r>
+            <a:endParaRPr lang="en-US" dirty="0"/>
+          </a:p>
+        </p:txBody>
+      </p:sp>
+      <p:sp>
+        <p:nvSpPr>
+          <p:cNvPr id="14" name="TextBox 13">
+            <a:extLst>
+              <a:ext uri="{FF2B5EF4-FFF2-40B4-BE49-F238E27FC236}">
+                <a16:creationId xmlns:a16="http://schemas.microsoft.com/office/drawing/2014/main" id="{768E9C6E-E791-141A-B494-80A8D779D9EB}"/>
+              </a:ext>
+            </a:extLst>
+          </p:cNvPr>
+          <p:cNvSpPr txBox="1"/>
+          <p:nvPr/>
+        </p:nvSpPr>
+        <p:spPr>
+          <a:xfrm>
+            <a:off x="4017302" y="4198374"/>
+            <a:ext cx="308098" cy="369332"/>
+          </a:xfrm>
+          <a:prstGeom prst="rect">
+            <a:avLst/>
+          </a:prstGeom>
+          <a:noFill/>
+        </p:spPr>
+        <p:txBody>
+          <a:bodyPr wrap="none" rtlCol="0">
+            <a:spAutoFit/>
+          </a:bodyPr>
+          <a:lstStyle/>
+          <a:p>
+            <a:r>
+              <a:rPr lang="pt-BR" dirty="0"/>
+              <a:t>8</a:t>
+            </a:r>
+            <a:endParaRPr lang="en-US" dirty="0"/>
+          </a:p>
+        </p:txBody>
+      </p:sp>
+      <p:sp>
+        <p:nvSpPr>
+          <p:cNvPr id="15" name="TextBox 14">
+            <a:extLst>
+              <a:ext uri="{FF2B5EF4-FFF2-40B4-BE49-F238E27FC236}">
+                <a16:creationId xmlns:a16="http://schemas.microsoft.com/office/drawing/2014/main" id="{734CB8E8-5CDF-F408-A574-802E3A4D4277}"/>
+              </a:ext>
+            </a:extLst>
+          </p:cNvPr>
+          <p:cNvSpPr txBox="1"/>
+          <p:nvPr/>
+        </p:nvSpPr>
+        <p:spPr>
+          <a:xfrm>
+            <a:off x="3127587" y="4198374"/>
+            <a:ext cx="431528" cy="369332"/>
+          </a:xfrm>
+          <a:prstGeom prst="rect">
+            <a:avLst/>
+          </a:prstGeom>
+          <a:noFill/>
+        </p:spPr>
+        <p:txBody>
+          <a:bodyPr wrap="none" rtlCol="0">
+            <a:spAutoFit/>
+          </a:bodyPr>
+          <a:lstStyle/>
+          <a:p>
+            <a:r>
+              <a:rPr lang="pt-BR" dirty="0"/>
+              <a:t>16</a:t>
+            </a:r>
+            <a:endParaRPr lang="en-US" dirty="0"/>
+          </a:p>
+        </p:txBody>
+      </p:sp>
+      <p:cxnSp>
+        <p:nvCxnSpPr>
+          <p:cNvPr id="17" name="Straight Connector 16">
+            <a:extLst>
+              <a:ext uri="{FF2B5EF4-FFF2-40B4-BE49-F238E27FC236}">
+                <a16:creationId xmlns:a16="http://schemas.microsoft.com/office/drawing/2014/main" id="{94BBA461-3315-A0EE-C90F-001485EB4EE2}"/>
+              </a:ext>
+            </a:extLst>
+          </p:cNvPr>
+          <p:cNvCxnSpPr/>
+          <p:nvPr/>
+        </p:nvCxnSpPr>
+        <p:spPr>
+          <a:xfrm>
+            <a:off x="7529376" y="2717176"/>
+            <a:ext cx="0" cy="2172929"/>
+          </a:xfrm>
+          <a:prstGeom prst="line">
+            <a:avLst/>
+          </a:prstGeom>
+          <a:ln w="28575"/>
+        </p:spPr>
+        <p:style>
+          <a:lnRef idx="2">
+            <a:schemeClr val="accent2"/>
+          </a:lnRef>
+          <a:fillRef idx="0">
+            <a:schemeClr val="accent2"/>
+          </a:fillRef>
+          <a:effectRef idx="1">
+            <a:schemeClr val="accent2"/>
+          </a:effectRef>
+          <a:fontRef idx="minor">
+            <a:schemeClr val="tx1"/>
+          </a:fontRef>
+        </p:style>
+      </p:cxnSp>
+      <p:sp>
+        <p:nvSpPr>
+          <p:cNvPr id="18" name="Rectangle: Rounded Corners 17">
+            <a:extLst>
+              <a:ext uri="{FF2B5EF4-FFF2-40B4-BE49-F238E27FC236}">
+                <a16:creationId xmlns:a16="http://schemas.microsoft.com/office/drawing/2014/main" id="{B7444C93-5D46-E7D5-C082-B45218DA1F7A}"/>
+              </a:ext>
+            </a:extLst>
+          </p:cNvPr>
+          <p:cNvSpPr/>
+          <p:nvPr/>
+        </p:nvSpPr>
+        <p:spPr>
+          <a:xfrm>
+            <a:off x="2101351" y="3226787"/>
+            <a:ext cx="828000" cy="828000"/>
+          </a:xfrm>
+          <a:prstGeom prst="roundRect">
+            <a:avLst/>
+          </a:prstGeom>
+          <a:solidFill>
+            <a:schemeClr val="bg1"/>
+          </a:solidFill>
+          <a:ln>
+            <a:solidFill>
+              <a:schemeClr val="tx1">
+                <a:lumMod val="75000"/>
+                <a:lumOff val="25000"/>
+              </a:schemeClr>
+            </a:solidFill>
+          </a:ln>
+        </p:spPr>
+        <p:style>
+          <a:lnRef idx="2">
+            <a:schemeClr val="accent1">
+              <a:shade val="15000"/>
+            </a:schemeClr>
+          </a:lnRef>
+          <a:fillRef idx="1">
+            <a:schemeClr val="accent1"/>
+          </a:fillRef>
+          <a:effectRef idx="0">
+            <a:schemeClr val="accent1"/>
+          </a:effectRef>
+          <a:fontRef idx="minor">
+            <a:schemeClr val="lt1"/>
+          </a:fontRef>
+        </p:style>
+        <p:txBody>
+          <a:bodyPr rtlCol="0" anchor="ctr"/>
+          <a:lstStyle/>
+          <a:p>
+            <a:pPr algn="ctr"/>
+            <a:r>
+              <a:rPr lang="pt-BR" dirty="0">
+                <a:solidFill>
+                  <a:schemeClr val="tx1">
+                    <a:lumMod val="65000"/>
+                    <a:lumOff val="35000"/>
+                  </a:schemeClr>
+                </a:solidFill>
+              </a:rPr>
+              <a:t>0</a:t>
+            </a:r>
+            <a:endParaRPr lang="en-US" dirty="0">
+              <a:solidFill>
+                <a:schemeClr val="tx1">
+                  <a:lumMod val="65000"/>
+                  <a:lumOff val="35000"/>
+                </a:schemeClr>
+              </a:solidFill>
+            </a:endParaRPr>
+          </a:p>
+        </p:txBody>
+      </p:sp>
+      <p:sp>
+        <p:nvSpPr>
+          <p:cNvPr id="19" name="TextBox 18">
+            <a:extLst>
+              <a:ext uri="{FF2B5EF4-FFF2-40B4-BE49-F238E27FC236}">
+                <a16:creationId xmlns:a16="http://schemas.microsoft.com/office/drawing/2014/main" id="{8A0BEEE0-4535-3530-C0F6-422ABAD08B13}"/>
+              </a:ext>
+            </a:extLst>
+          </p:cNvPr>
+          <p:cNvSpPr txBox="1"/>
+          <p:nvPr/>
+        </p:nvSpPr>
+        <p:spPr>
+          <a:xfrm>
+            <a:off x="2299587" y="4198374"/>
+            <a:ext cx="431528" cy="369332"/>
+          </a:xfrm>
+          <a:prstGeom prst="rect">
+            <a:avLst/>
+          </a:prstGeom>
+          <a:noFill/>
+        </p:spPr>
+        <p:txBody>
+          <a:bodyPr wrap="none" rtlCol="0">
+            <a:spAutoFit/>
+          </a:bodyPr>
+          <a:lstStyle/>
+          <a:p>
+            <a:r>
+              <a:rPr lang="pt-BR" dirty="0"/>
+              <a:t>32</a:t>
+            </a:r>
+            <a:endParaRPr lang="en-US" dirty="0"/>
+          </a:p>
+        </p:txBody>
+      </p:sp>
+    </p:spTree>
+    <p:extLst>
+      <p:ext uri="{BB962C8B-B14F-4D97-AF65-F5344CB8AC3E}">
+        <p14:creationId xmlns:p14="http://schemas.microsoft.com/office/powerpoint/2010/main" val="1068250404"/>
       </p:ext>
     </p:extLst>
   </p:cSld>

</xml_diff>